<commit_message>
boxgen added, master update
</commit_message>
<xml_diff>
--- a/output.pptx
+++ b/output.pptx
@@ -3270,7 +3270,7 @@
                 <a:latin typeface="Times New Roman"/>
                 <a:ea typeface="Times New Roman"/>
               </a:rPr>
-              <a:t>test</a:t>
+              <a:t>REC Rick</a:t>
             </a:r>
             <a:endParaRPr b="0" lang="en-AU" sz="3600" spc="-1" strike="noStrike">
               <a:solidFill>
@@ -3327,7 +3327,7 @@
                 <a:latin typeface="Times New Roman"/>
                 <a:ea typeface="Times New Roman"/>
               </a:rPr>
-              <a:t>MAJ test</a:t>
+              <a:t>MAJ Jazz</a:t>
             </a:r>
             <a:br>
               <a:rPr sz="1100"/>
@@ -3410,7 +3410,7 @@
                 <a:latin typeface="Courgette"/>
                 <a:ea typeface="Courgette"/>
               </a:rPr>
-              <a:t>MAJtest</a:t>
+              <a:t>MAJJazz</a:t>
             </a:r>
             <a:endParaRPr b="0" lang="en-AU" sz="2800" spc="-1" strike="noStrike">
               <a:solidFill>
@@ -3519,7 +3519,7 @@
                 <a:latin typeface="Times New Roman"/>
                 <a:ea typeface="Times New Roman"/>
               </a:rPr>
-              <a:t>test,</a:t>
+              <a:t>Jazz,</a:t>
             </a:r>
             <a:r>
               <a:rPr b="0" lang="en-AU" sz="2000" spc="-1" strike="noStrike">
@@ -3586,7 +3586,7 @@
                 <a:latin typeface="Times New Roman"/>
                 <a:ea typeface="Times New Roman"/>
               </a:rPr>
-              <a:t>test</a:t>
+              <a:t>REC Rick</a:t>
             </a:r>
             <a:endParaRPr b="0" lang="en-AU" sz="3200" spc="-1" strike="noStrike">
               <a:solidFill>
@@ -3673,7 +3673,7 @@
                 <a:latin typeface="Times New Roman"/>
                 <a:ea typeface="Times New Roman"/>
               </a:rPr>
-              <a:t>test</a:t>
+              <a:t>30th Aug 2023</a:t>
             </a:r>
             <a:endParaRPr b="0" lang="en-AU" sz="2000" spc="-1" strike="noStrike">
               <a:solidFill>
@@ -3730,7 +3730,7 @@
                 <a:latin typeface="Times New Roman"/>
                 <a:ea typeface="Times New Roman"/>
               </a:rPr>
-              <a:t>test </a:t>
+              <a:t>REC Rick </a:t>
             </a:r>
             <a:r>
               <a:rPr b="0" lang="en-AU" sz="2000" spc="-1" strike="noStrike">
@@ -4000,7 +4000,7 @@
                 <a:latin typeface="Times New Roman"/>
                 <a:ea typeface="Times New Roman"/>
               </a:rPr>
-              <a:t>test</a:t>
+              <a:t>REC Rick</a:t>
             </a:r>
             <a:endParaRPr b="0" lang="en-AU" sz="3600" spc="-1" strike="noStrike">
               <a:solidFill>
@@ -4057,7 +4057,7 @@
                 <a:latin typeface="Times New Roman"/>
                 <a:ea typeface="Times New Roman"/>
               </a:rPr>
-              <a:t>MAJ test</a:t>
+              <a:t>MAJ Jazz</a:t>
             </a:r>
             <a:br>
               <a:rPr sz="1100"/>
@@ -4150,7 +4150,7 @@
                 <a:latin typeface="Courgette"/>
                 <a:ea typeface="Courgette"/>
               </a:rPr>
-              <a:t>MAJ test</a:t>
+              <a:t>MAJ Jazz</a:t>
             </a:r>
             <a:endParaRPr b="0" lang="en-AU" sz="2800" spc="-1" strike="noStrike">
               <a:solidFill>
@@ -4259,7 +4259,7 @@
                 <a:latin typeface="Times New Roman"/>
                 <a:ea typeface="Times New Roman"/>
               </a:rPr>
-              <a:t>test,</a:t>
+              <a:t>Jazz,</a:t>
             </a:r>
             <a:r>
               <a:rPr b="0" lang="en-AU" sz="2000" spc="-1" strike="noStrike">
@@ -4326,7 +4326,7 @@
                 <a:latin typeface="Times New Roman"/>
                 <a:ea typeface="Times New Roman"/>
               </a:rPr>
-              <a:t>test</a:t>
+              <a:t>REC Rick</a:t>
             </a:r>
             <a:endParaRPr b="0" lang="en-AU" sz="3200" spc="-1" strike="noStrike">
               <a:solidFill>
@@ -4429,7 +4429,7 @@
                 <a:latin typeface="Times New Roman"/>
                 <a:ea typeface="Times New Roman"/>
               </a:rPr>
-              <a:t>test.</a:t>
+              <a:t>30th Aug 2023.</a:t>
             </a:r>
             <a:endParaRPr b="0" lang="en-AU" sz="2000" spc="-1" strike="noStrike">
               <a:solidFill>
@@ -4486,7 +4486,7 @@
                 <a:latin typeface="Times New Roman"/>
                 <a:ea typeface="Times New Roman"/>
               </a:rPr>
-              <a:t>test </a:t>
+              <a:t>REC Rick </a:t>
             </a:r>
             <a:r>
               <a:rPr b="0" lang="en-AU" sz="2000" spc="-1" strike="noStrike">
@@ -4769,7 +4769,7 @@
                 <a:latin typeface="Times New Roman"/>
                 <a:ea typeface="Times New Roman"/>
               </a:rPr>
-              <a:t>test</a:t>
+              <a:t>REC Rick</a:t>
             </a:r>
             <a:endParaRPr b="0" lang="en-AU" sz="3600" spc="-1" strike="noStrike">
               <a:solidFill>
@@ -4826,7 +4826,7 @@
                 <a:latin typeface="Times New Roman"/>
                 <a:ea typeface="Times New Roman"/>
               </a:rPr>
-              <a:t>MAJ test</a:t>
+              <a:t>MAJ Jazz</a:t>
             </a:r>
             <a:br>
               <a:rPr sz="1100"/>
@@ -4909,7 +4909,7 @@
                 <a:latin typeface="Courgette"/>
                 <a:ea typeface="Courgette"/>
               </a:rPr>
-              <a:t>MAJ test</a:t>
+              <a:t>MAJ Jazz</a:t>
             </a:r>
             <a:endParaRPr b="0" lang="en-AU" sz="2800" spc="-1" strike="noStrike">
               <a:solidFill>
@@ -5018,7 +5018,7 @@
                 <a:latin typeface="Times New Roman"/>
                 <a:ea typeface="Times New Roman"/>
               </a:rPr>
-              <a:t>test,</a:t>
+              <a:t>Jazz,</a:t>
             </a:r>
             <a:r>
               <a:rPr b="0" lang="en-AU" sz="2000" spc="-1" strike="noStrike">
@@ -5085,7 +5085,7 @@
                 <a:latin typeface="Times New Roman"/>
                 <a:ea typeface="Times New Roman"/>
               </a:rPr>
-              <a:t>test</a:t>
+              <a:t>REC Rick</a:t>
             </a:r>
             <a:endParaRPr b="0" lang="en-AU" sz="3200" spc="-1" strike="noStrike">
               <a:solidFill>
@@ -5188,7 +5188,7 @@
                 <a:latin typeface="Times New Roman"/>
                 <a:ea typeface="Times New Roman"/>
               </a:rPr>
-              <a:t>test.</a:t>
+              <a:t>30th Aug 2023.</a:t>
             </a:r>
             <a:endParaRPr b="0" lang="en-AU" sz="2000" spc="-1" strike="noStrike">
               <a:solidFill>
@@ -5245,7 +5245,7 @@
                 <a:latin typeface="Times New Roman"/>
                 <a:ea typeface="Times New Roman"/>
               </a:rPr>
-              <a:t>test </a:t>
+              <a:t>REC Rick </a:t>
             </a:r>
             <a:r>
               <a:rPr b="0" lang="en-AU" sz="2000" spc="-1" strike="noStrike">
@@ -5528,7 +5528,7 @@
                 <a:latin typeface="Times New Roman"/>
                 <a:ea typeface="Times New Roman"/>
               </a:rPr>
-              <a:t>test</a:t>
+              <a:t>REC Rick</a:t>
             </a:r>
             <a:endParaRPr b="0" lang="en-AU" sz="3600" spc="-1" strike="noStrike">
               <a:solidFill>
@@ -5585,7 +5585,7 @@
                 <a:latin typeface="Times New Roman"/>
                 <a:ea typeface="Times New Roman"/>
               </a:rPr>
-              <a:t>MAJ test</a:t>
+              <a:t>MAJ Jazz</a:t>
             </a:r>
             <a:br>
               <a:rPr sz="1100"/>
@@ -5678,7 +5678,7 @@
                 <a:latin typeface="Courgette"/>
                 <a:ea typeface="Courgette"/>
               </a:rPr>
-              <a:t>MAJ test</a:t>
+              <a:t>MAJ Jazz</a:t>
             </a:r>
             <a:endParaRPr b="0" lang="en-AU" sz="2800" spc="-1" strike="noStrike">
               <a:solidFill>
@@ -5787,7 +5787,7 @@
                 <a:latin typeface="Times New Roman"/>
                 <a:ea typeface="Times New Roman"/>
               </a:rPr>
-              <a:t>test,</a:t>
+              <a:t>Jazz,</a:t>
             </a:r>
             <a:r>
               <a:rPr b="0" lang="en-AU" sz="2000" spc="-1" strike="noStrike">
@@ -5854,7 +5854,7 @@
                 <a:latin typeface="Times New Roman"/>
                 <a:ea typeface="Times New Roman"/>
               </a:rPr>
-              <a:t>test</a:t>
+              <a:t>REC Rick</a:t>
             </a:r>
             <a:endParaRPr b="0" lang="en-AU" sz="3200" spc="-1" strike="noStrike">
               <a:solidFill>
@@ -5957,7 +5957,7 @@
                 <a:latin typeface="Times New Roman"/>
                 <a:ea typeface="Times New Roman"/>
               </a:rPr>
-              <a:t>test.</a:t>
+              <a:t>30th Aug 2023.</a:t>
             </a:r>
             <a:endParaRPr b="0" lang="en-AU" sz="2000" spc="-1" strike="noStrike">
               <a:solidFill>
@@ -6014,7 +6014,7 @@
                 <a:latin typeface="Times New Roman"/>
                 <a:ea typeface="Times New Roman"/>
               </a:rPr>
-              <a:t>test </a:t>
+              <a:t>REC Rick </a:t>
             </a:r>
             <a:r>
               <a:rPr b="0" lang="en-AU" sz="2000" spc="-1" strike="noStrike">
@@ -6297,7 +6297,7 @@
                 <a:latin typeface="Times New Roman"/>
                 <a:ea typeface="Times New Roman"/>
               </a:rPr>
-              <a:t>test</a:t>
+              <a:t>REC Rick</a:t>
             </a:r>
             <a:endParaRPr b="0" lang="en-AU" sz="3600" spc="-1" strike="noStrike">
               <a:solidFill>
@@ -6354,7 +6354,7 @@
                 <a:latin typeface="Times New Roman"/>
                 <a:ea typeface="Times New Roman"/>
               </a:rPr>
-              <a:t>MAJ test</a:t>
+              <a:t>MAJ Jazz</a:t>
             </a:r>
             <a:br>
               <a:rPr sz="1100"/>
@@ -6447,7 +6447,7 @@
                 <a:latin typeface="Courgette"/>
                 <a:ea typeface="Courgette"/>
               </a:rPr>
-              <a:t>MAJ test</a:t>
+              <a:t>MAJ Jazz</a:t>
             </a:r>
             <a:endParaRPr b="0" lang="en-AU" sz="2800" spc="-1" strike="noStrike">
               <a:solidFill>
@@ -6556,7 +6556,7 @@
                 <a:latin typeface="Times New Roman"/>
                 <a:ea typeface="Times New Roman"/>
               </a:rPr>
-              <a:t>test,</a:t>
+              <a:t>Jazz,</a:t>
             </a:r>
             <a:r>
               <a:rPr b="0" lang="en-AU" sz="2000" spc="-1" strike="noStrike">
@@ -6623,7 +6623,7 @@
                 <a:latin typeface="Times New Roman"/>
                 <a:ea typeface="Times New Roman"/>
               </a:rPr>
-              <a:t>test</a:t>
+              <a:t>REC Rick</a:t>
             </a:r>
             <a:endParaRPr b="0" lang="en-AU" sz="3200" spc="-1" strike="noStrike">
               <a:solidFill>
@@ -6746,7 +6746,7 @@
                 <a:latin typeface="Times New Roman"/>
                 <a:ea typeface="Times New Roman"/>
               </a:rPr>
-              <a:t>test.</a:t>
+              <a:t>30th Aug 2023.</a:t>
             </a:r>
             <a:endParaRPr b="0" lang="en-AU" sz="2000" spc="-1" strike="noStrike">
               <a:solidFill>
@@ -6803,7 +6803,7 @@
                 <a:latin typeface="Times New Roman"/>
                 <a:ea typeface="Times New Roman"/>
               </a:rPr>
-              <a:t>test </a:t>
+              <a:t>REC Rick </a:t>
             </a:r>
             <a:r>
               <a:rPr b="0" lang="en-AU" sz="2000" spc="-1" strike="noStrike">
@@ -7086,7 +7086,7 @@
                 <a:latin typeface="Times New Roman"/>
                 <a:ea typeface="Times New Roman"/>
               </a:rPr>
-              <a:t>test</a:t>
+              <a:t>REC Rick</a:t>
             </a:r>
             <a:endParaRPr b="0" lang="en-AU" sz="3600" spc="-1" strike="noStrike">
               <a:solidFill>
@@ -7143,7 +7143,7 @@
                 <a:latin typeface="Times New Roman"/>
                 <a:ea typeface="DejaVu Sans"/>
               </a:rPr>
-              <a:t>MAJ test</a:t>
+              <a:t>MAJ Jazz</a:t>
             </a:r>
             <a:br>
               <a:rPr sz="1100"/>
@@ -7226,7 +7226,7 @@
                 <a:latin typeface="Courgette"/>
                 <a:ea typeface="Courgette"/>
               </a:rPr>
-              <a:t>MAJ test</a:t>
+              <a:t>MAJ Jazz</a:t>
             </a:r>
             <a:endParaRPr b="0" lang="en-AU" sz="2800" spc="-1" strike="noStrike">
               <a:solidFill>
@@ -7335,7 +7335,7 @@
                 <a:latin typeface="Times New Roman"/>
                 <a:ea typeface="Times New Roman"/>
               </a:rPr>
-              <a:t>test,</a:t>
+              <a:t>Jazz,</a:t>
             </a:r>
             <a:r>
               <a:rPr b="0" lang="en-AU" sz="2000" spc="-1" strike="noStrike">
@@ -7402,7 +7402,7 @@
                 <a:latin typeface="Times New Roman"/>
                 <a:ea typeface="Times New Roman"/>
               </a:rPr>
-              <a:t>test</a:t>
+              <a:t>REC Rick</a:t>
             </a:r>
             <a:endParaRPr b="0" lang="en-AU" sz="3200" spc="-1" strike="noStrike">
               <a:solidFill>
@@ -7492,7 +7492,7 @@
                 <a:latin typeface="Times New Roman"/>
                 <a:ea typeface="Times New Roman"/>
               </a:rPr>
-              <a:t>test</a:t>
+              <a:t>30th Aug 2023</a:t>
             </a:r>
             <a:r>
               <a:rPr b="0" lang="en-AU" sz="2000" spc="-1" strike="noStrike">
@@ -7559,7 +7559,7 @@
                 <a:latin typeface="Times New Roman"/>
                 <a:ea typeface="Times New Roman"/>
               </a:rPr>
-              <a:t>test</a:t>
+              <a:t>REC Rick</a:t>
             </a:r>
             <a:r>
               <a:rPr b="0" i="1" lang="en-AU" sz="2000" spc="-1" strike="noStrike">
@@ -7839,7 +7839,7 @@
                 <a:latin typeface="Times New Roman"/>
                 <a:ea typeface="Times New Roman"/>
               </a:rPr>
-              <a:t>test</a:t>
+              <a:t>REC Rick</a:t>
             </a:r>
             <a:endParaRPr b="0" lang="en-AU" sz="3600" spc="-1" strike="noStrike">
               <a:solidFill>
@@ -7896,7 +7896,7 @@
                 <a:latin typeface="Times New Roman"/>
                 <a:ea typeface="DejaVu Sans"/>
               </a:rPr>
-              <a:t>MAJ test</a:t>
+              <a:t>MAJ Jazz</a:t>
             </a:r>
             <a:br>
               <a:rPr sz="1100"/>
@@ -7989,7 +7989,7 @@
                 <a:latin typeface="Courgette"/>
                 <a:ea typeface="Courgette"/>
               </a:rPr>
-              <a:t>MAJ test</a:t>
+              <a:t>MAJ Jazz</a:t>
             </a:r>
             <a:endParaRPr b="0" lang="en-AU" sz="2800" spc="-1" strike="noStrike">
               <a:solidFill>
@@ -8098,7 +8098,7 @@
                 <a:latin typeface="Times New Roman"/>
                 <a:ea typeface="Times New Roman"/>
               </a:rPr>
-              <a:t>test,</a:t>
+              <a:t>Jazz,</a:t>
             </a:r>
             <a:r>
               <a:rPr b="0" lang="en-AU" sz="2000" spc="-1" strike="noStrike">
@@ -8165,7 +8165,7 @@
                 <a:latin typeface="Times New Roman"/>
                 <a:ea typeface="Times New Roman"/>
               </a:rPr>
-              <a:t>test</a:t>
+              <a:t>REC Rick</a:t>
             </a:r>
             <a:endParaRPr b="0" lang="en-AU" sz="3200" spc="-1" strike="noStrike">
               <a:solidFill>
@@ -8232,7 +8232,7 @@
                 <a:latin typeface="Times New Roman"/>
                 <a:ea typeface="Times New Roman"/>
               </a:rPr>
-              <a:t>test</a:t>
+              <a:t>30th Aug 2023</a:t>
             </a:r>
             <a:r>
               <a:rPr b="0" lang="en-AU" sz="2000" spc="-1" strike="noStrike">
@@ -8299,7 +8299,7 @@
                 <a:latin typeface="Times New Roman"/>
                 <a:ea typeface="Times New Roman"/>
               </a:rPr>
-              <a:t>test</a:t>
+              <a:t>REC Rick</a:t>
             </a:r>
             <a:r>
               <a:rPr b="0" lang="en-AU" sz="2000" spc="-1" strike="noStrike">
@@ -8569,7 +8569,7 @@
                 <a:latin typeface="Times New Roman"/>
                 <a:ea typeface="Times New Roman"/>
               </a:rPr>
-              <a:t>test</a:t>
+              <a:t>REC Rick</a:t>
             </a:r>
             <a:endParaRPr b="0" lang="en-AU" sz="3200" spc="-1" strike="noStrike">
               <a:solidFill>
@@ -8626,7 +8626,7 @@
                 <a:latin typeface="Times New Roman"/>
                 <a:ea typeface="Times New Roman"/>
               </a:rPr>
-              <a:t>MAJ test</a:t>
+              <a:t>MAJ Jazz</a:t>
             </a:r>
             <a:br>
               <a:rPr sz="1100"/>
@@ -8709,7 +8709,7 @@
                 <a:latin typeface="Courgette"/>
                 <a:ea typeface="Courgette"/>
               </a:rPr>
-              <a:t>MAJ test</a:t>
+              <a:t>MAJ Jazz</a:t>
             </a:r>
             <a:endParaRPr b="0" lang="en-AU" sz="2800" spc="-1" strike="noStrike">
               <a:solidFill>
@@ -8798,7 +8798,7 @@
                 <a:latin typeface="Times New Roman"/>
                 <a:ea typeface="Times New Roman"/>
               </a:rPr>
-              <a:t>Major test,</a:t>
+              <a:t>Major Jazz,</a:t>
             </a:r>
             <a:r>
               <a:rPr b="0" lang="en-AU" sz="2000" spc="-1" strike="noStrike">
@@ -8865,7 +8865,7 @@
                 <a:latin typeface="Times New Roman"/>
                 <a:ea typeface="Times New Roman"/>
               </a:rPr>
-              <a:t>test</a:t>
+              <a:t>REC Rick</a:t>
             </a:r>
             <a:endParaRPr b="0" lang="en-AU" sz="3200" spc="-1" strike="noStrike">
               <a:solidFill>
@@ -8968,7 +8968,7 @@
                 <a:latin typeface="Times New Roman"/>
                 <a:ea typeface="Times New Roman"/>
               </a:rPr>
-              <a:t>test.</a:t>
+              <a:t>30th Aug 2023.</a:t>
             </a:r>
             <a:endParaRPr b="0" lang="en-AU" sz="2000" spc="-1" strike="noStrike">
               <a:solidFill>
@@ -9025,7 +9025,7 @@
                 <a:latin typeface="Times New Roman"/>
                 <a:ea typeface="Times New Roman"/>
               </a:rPr>
-              <a:t>test </a:t>
+              <a:t>REC Rick </a:t>
             </a:r>
             <a:r>
               <a:rPr b="0" lang="en-AU" sz="2000" spc="-1" strike="noStrike">
@@ -9308,7 +9308,7 @@
                 <a:latin typeface="Times New Roman"/>
                 <a:ea typeface="Times New Roman"/>
               </a:rPr>
-              <a:t>test</a:t>
+              <a:t>REC Rick</a:t>
             </a:r>
             <a:endParaRPr b="0" lang="en-AU" sz="3600" spc="-1" strike="noStrike">
               <a:solidFill>
@@ -9365,7 +9365,7 @@
                 <a:latin typeface="Times New Roman"/>
                 <a:ea typeface="Times New Roman"/>
               </a:rPr>
-              <a:t>LTCOL test</a:t>
+              <a:t>LTCOL Jazz</a:t>
             </a:r>
             <a:br>
               <a:rPr sz="1100"/>
@@ -9448,7 +9448,7 @@
                 <a:latin typeface="Courgette"/>
                 <a:ea typeface="Courgette"/>
               </a:rPr>
-              <a:t>LTCOL test</a:t>
+              <a:t>LTCOL Jazz</a:t>
             </a:r>
             <a:endParaRPr b="0" lang="en-AU" sz="2800" spc="-1" strike="noStrike">
               <a:solidFill>
@@ -9537,7 +9537,7 @@
                 <a:latin typeface="Times New Roman"/>
                 <a:ea typeface="Times New Roman"/>
               </a:rPr>
-              <a:t>Lieutenant Colonel test,</a:t>
+              <a:t>Lieutenant Colonel Jazz,</a:t>
             </a:r>
             <a:r>
               <a:rPr b="0" lang="en-AU" sz="2000" spc="-1" strike="noStrike">
@@ -9627,7 +9627,7 @@
                 <a:latin typeface="Times New Roman"/>
                 <a:ea typeface="Times New Roman"/>
               </a:rPr>
-              <a:t>test</a:t>
+              <a:t>REC Rick</a:t>
             </a:r>
             <a:endParaRPr b="0" lang="en-AU" sz="3200" spc="-1" strike="noStrike">
               <a:solidFill>
@@ -9714,7 +9714,7 @@
                 <a:latin typeface="Times New Roman"/>
                 <a:ea typeface="Times New Roman"/>
               </a:rPr>
-              <a:t>test.</a:t>
+              <a:t>30th Aug 2023.</a:t>
             </a:r>
             <a:endParaRPr b="0" lang="en-AU" sz="2000" spc="-1" strike="noStrike">
               <a:solidFill>
@@ -9771,7 +9771,7 @@
                 <a:latin typeface="Times New Roman"/>
                 <a:ea typeface="Times New Roman"/>
               </a:rPr>
-              <a:t>test </a:t>
+              <a:t>REC Rick </a:t>
             </a:r>
             <a:r>
               <a:rPr b="0" lang="en-AU" sz="2000" spc="-1" strike="noStrike">
@@ -10054,7 +10054,7 @@
                 <a:latin typeface="Times New Roman"/>
                 <a:ea typeface="Times New Roman"/>
               </a:rPr>
-              <a:t>test</a:t>
+              <a:t>REC Rick</a:t>
             </a:r>
             <a:endParaRPr b="0" lang="en-AU" sz="3600" spc="-1" strike="noStrike">
               <a:solidFill>
@@ -10111,7 +10111,7 @@
                 <a:latin typeface="Times New Roman"/>
                 <a:ea typeface="Times New Roman"/>
               </a:rPr>
-              <a:t>LTCOL test</a:t>
+              <a:t>LTCOL Jazz</a:t>
             </a:r>
             <a:br>
               <a:rPr sz="1100"/>
@@ -10194,7 +10194,7 @@
                 <a:latin typeface="Courgette"/>
                 <a:ea typeface="Courgette"/>
               </a:rPr>
-              <a:t>LTCOL test</a:t>
+              <a:t>LTCOL Jazz</a:t>
             </a:r>
             <a:endParaRPr b="0" lang="en-AU" sz="2800" spc="-1" strike="noStrike">
               <a:solidFill>
@@ -10303,7 +10303,7 @@
                 <a:latin typeface="Times New Roman"/>
                 <a:ea typeface="Times New Roman"/>
               </a:rPr>
-              <a:t>test,</a:t>
+              <a:t>Jazz,</a:t>
             </a:r>
             <a:r>
               <a:rPr b="0" lang="en-AU" sz="2000" spc="-1" strike="noStrike">
@@ -10393,7 +10393,7 @@
                 <a:latin typeface="Times New Roman"/>
                 <a:ea typeface="Times New Roman"/>
               </a:rPr>
-              <a:t>test</a:t>
+              <a:t>REC Rick</a:t>
             </a:r>
             <a:endParaRPr b="0" lang="en-AU" sz="3200" spc="-1" strike="noStrike">
               <a:solidFill>
@@ -10480,7 +10480,7 @@
                 <a:latin typeface="Times New Roman"/>
                 <a:ea typeface="Times New Roman"/>
               </a:rPr>
-              <a:t>test.</a:t>
+              <a:t>30th Aug 2023.</a:t>
             </a:r>
             <a:endParaRPr b="0" lang="en-AU" sz="2000" spc="-1" strike="noStrike">
               <a:solidFill>
@@ -10537,7 +10537,7 @@
                 <a:latin typeface="Times New Roman"/>
                 <a:ea typeface="Times New Roman"/>
               </a:rPr>
-              <a:t>test </a:t>
+              <a:t>REC Rick </a:t>
             </a:r>
             <a:r>
               <a:rPr b="0" lang="en-AU" sz="2000" spc="-1" strike="noStrike">
@@ -10797,7 +10797,7 @@
                 <a:latin typeface="Times New Roman"/>
                 <a:ea typeface="Times New Roman"/>
               </a:rPr>
-              <a:t>test</a:t>
+              <a:t>REC Rick</a:t>
             </a:r>
             <a:endParaRPr b="0" lang="en-AU" sz="3600" spc="-1" strike="noStrike">
               <a:solidFill>
@@ -10854,7 +10854,7 @@
                 <a:latin typeface="Times New Roman"/>
                 <a:ea typeface="Times New Roman"/>
               </a:rPr>
-              <a:t>MAJ test</a:t>
+              <a:t>MAJ Jazz</a:t>
             </a:r>
             <a:br>
               <a:rPr sz="1100"/>
@@ -10947,7 +10947,7 @@
                 <a:latin typeface="Courgette"/>
                 <a:ea typeface="Courgette"/>
               </a:rPr>
-              <a:t>MAJ test</a:t>
+              <a:t>MAJ Jazz</a:t>
             </a:r>
             <a:endParaRPr b="0" lang="en-AU" sz="2800" spc="-1" strike="noStrike">
               <a:solidFill>
@@ -11056,7 +11056,7 @@
                 <a:latin typeface="Times New Roman"/>
                 <a:ea typeface="Times New Roman"/>
               </a:rPr>
-              <a:t>test,</a:t>
+              <a:t>Jazz,</a:t>
             </a:r>
             <a:r>
               <a:rPr b="0" lang="en-AU" sz="2000" spc="-1" strike="noStrike">
@@ -11123,7 +11123,7 @@
                 <a:latin typeface="Times New Roman"/>
                 <a:ea typeface="Times New Roman"/>
               </a:rPr>
-              <a:t>test</a:t>
+              <a:t>REC Rick</a:t>
             </a:r>
             <a:endParaRPr b="0" lang="en-AU" sz="3200" spc="-1" strike="noStrike">
               <a:solidFill>
@@ -11210,7 +11210,7 @@
                 <a:latin typeface="Times New Roman"/>
                 <a:ea typeface="Times New Roman"/>
               </a:rPr>
-              <a:t>test.</a:t>
+              <a:t>30th Aug 2023.</a:t>
             </a:r>
             <a:endParaRPr b="0" lang="en-AU" sz="2000" spc="-1" strike="noStrike">
               <a:solidFill>
@@ -11267,7 +11267,7 @@
                 <a:latin typeface="Times New Roman"/>
                 <a:ea typeface="Times New Roman"/>
               </a:rPr>
-              <a:t>test </a:t>
+              <a:t>REC Rick </a:t>
             </a:r>
             <a:r>
               <a:rPr b="0" lang="en-AU" sz="2000" spc="-1" strike="noStrike">
@@ -11596,7 +11596,7 @@
                 <a:latin typeface="Times New Roman"/>
                 <a:ea typeface="Times New Roman"/>
               </a:rPr>
-              <a:t>test</a:t>
+              <a:t>REC Rick</a:t>
             </a:r>
             <a:endParaRPr b="0" lang="en-AU" sz="3600" spc="-1" strike="noStrike">
               <a:solidFill>
@@ -11653,7 +11653,7 @@
                 <a:latin typeface="Times New Roman"/>
                 <a:ea typeface="Times New Roman"/>
               </a:rPr>
-              <a:t>MAJ test</a:t>
+              <a:t>MAJ Jazz</a:t>
             </a:r>
             <a:br>
               <a:rPr sz="1100"/>
@@ -11746,7 +11746,7 @@
                 <a:latin typeface="Courgette"/>
                 <a:ea typeface="Courgette"/>
               </a:rPr>
-              <a:t>MAJ test</a:t>
+              <a:t>MAJ Jazz</a:t>
             </a:r>
             <a:endParaRPr b="0" lang="en-AU" sz="2800" spc="-1" strike="noStrike">
               <a:solidFill>
@@ -11855,7 +11855,7 @@
                 <a:latin typeface="Times New Roman"/>
                 <a:ea typeface="Times New Roman"/>
               </a:rPr>
-              <a:t>test,</a:t>
+              <a:t>Jazz,</a:t>
             </a:r>
             <a:r>
               <a:rPr b="0" lang="en-AU" sz="2000" spc="-1" strike="noStrike">
@@ -11922,7 +11922,7 @@
                 <a:latin typeface="Times New Roman"/>
                 <a:ea typeface="Times New Roman"/>
               </a:rPr>
-              <a:t>test</a:t>
+              <a:t>REC Rick</a:t>
             </a:r>
             <a:endParaRPr b="0" lang="en-AU" sz="3200" spc="-1" strike="noStrike">
               <a:solidFill>
@@ -12009,7 +12009,7 @@
                 <a:latin typeface="Times New Roman"/>
                 <a:ea typeface="Times New Roman"/>
               </a:rPr>
-              <a:t>test.</a:t>
+              <a:t>30th Aug 2023.</a:t>
             </a:r>
             <a:endParaRPr b="0" lang="en-AU" sz="2000" spc="-1" strike="noStrike">
               <a:solidFill>
@@ -12066,7 +12066,7 @@
                 <a:latin typeface="Times New Roman"/>
                 <a:ea typeface="Times New Roman"/>
               </a:rPr>
-              <a:t>test </a:t>
+              <a:t>REC Rick </a:t>
             </a:r>
             <a:r>
               <a:rPr b="0" lang="en-AU" sz="2000" spc="-1" strike="noStrike">
@@ -12372,7 +12372,7 @@
                 <a:latin typeface="Times New Roman"/>
                 <a:ea typeface="Times New Roman"/>
               </a:rPr>
-              <a:t>test</a:t>
+              <a:t>REC Rick</a:t>
             </a:r>
             <a:endParaRPr b="0" lang="en-AU" sz="3600" spc="-1" strike="noStrike">
               <a:solidFill>
@@ -12429,7 +12429,7 @@
                 <a:latin typeface="Times New Roman"/>
                 <a:ea typeface="Times New Roman"/>
               </a:rPr>
-              <a:t>MAJ test</a:t>
+              <a:t>MAJ Jazz</a:t>
             </a:r>
             <a:br>
               <a:rPr sz="1100"/>
@@ -12522,7 +12522,7 @@
                 <a:latin typeface="Courgette"/>
                 <a:ea typeface="Courgette"/>
               </a:rPr>
-              <a:t>MAJ test</a:t>
+              <a:t>MAJ Jazz</a:t>
             </a:r>
             <a:endParaRPr b="0" lang="en-AU" sz="2800" spc="-1" strike="noStrike">
               <a:solidFill>
@@ -12631,7 +12631,7 @@
                 <a:latin typeface="Times New Roman"/>
                 <a:ea typeface="Times New Roman"/>
               </a:rPr>
-              <a:t>test,</a:t>
+              <a:t>Jazz,</a:t>
             </a:r>
             <a:r>
               <a:rPr b="0" lang="en-AU" sz="2000" spc="-1" strike="noStrike">
@@ -12698,7 +12698,7 @@
                 <a:latin typeface="Times New Roman"/>
                 <a:ea typeface="Times New Roman"/>
               </a:rPr>
-              <a:t>test</a:t>
+              <a:t>REC Rick</a:t>
             </a:r>
             <a:endParaRPr b="0" lang="en-AU" sz="3200" spc="-1" strike="noStrike">
               <a:solidFill>
@@ -12801,7 +12801,7 @@
                 <a:latin typeface="Times New Roman"/>
                 <a:ea typeface="Times New Roman"/>
               </a:rPr>
-              <a:t>test.</a:t>
+              <a:t>30th Aug 2023.</a:t>
             </a:r>
             <a:endParaRPr b="0" lang="en-AU" sz="2000" spc="-1" strike="noStrike">
               <a:solidFill>
@@ -12858,7 +12858,7 @@
                 <a:latin typeface="Times New Roman"/>
                 <a:ea typeface="Times New Roman"/>
               </a:rPr>
-              <a:t>test </a:t>
+              <a:t>REC Rick </a:t>
             </a:r>
             <a:r>
               <a:rPr b="0" lang="en-AU" sz="2000" spc="-1" strike="noStrike">
@@ -13141,7 +13141,7 @@
                 <a:latin typeface="Times New Roman"/>
                 <a:ea typeface="Times New Roman"/>
               </a:rPr>
-              <a:t>test</a:t>
+              <a:t>REC Rick</a:t>
             </a:r>
             <a:endParaRPr b="0" lang="en-AU" sz="3600" spc="-1" strike="noStrike">
               <a:solidFill>
@@ -13198,7 +13198,7 @@
                 <a:latin typeface="Times New Roman"/>
                 <a:ea typeface="Times New Roman"/>
               </a:rPr>
-              <a:t>MAJ test</a:t>
+              <a:t>MAJ Jazz</a:t>
             </a:r>
             <a:br>
               <a:rPr sz="1100"/>
@@ -13291,7 +13291,7 @@
                 <a:latin typeface="Courgette"/>
                 <a:ea typeface="Courgette"/>
               </a:rPr>
-              <a:t>MAJ test</a:t>
+              <a:t>MAJ Jazz</a:t>
             </a:r>
             <a:endParaRPr b="0" lang="en-AU" sz="2800" spc="-1" strike="noStrike">
               <a:solidFill>
@@ -13400,7 +13400,7 @@
                 <a:latin typeface="Times New Roman"/>
                 <a:ea typeface="Times New Roman"/>
               </a:rPr>
-              <a:t>test,</a:t>
+              <a:t>Jazz,</a:t>
             </a:r>
             <a:r>
               <a:rPr b="0" lang="en-AU" sz="2000" spc="-1" strike="noStrike">
@@ -13467,7 +13467,7 @@
                 <a:latin typeface="Times New Roman"/>
                 <a:ea typeface="Times New Roman"/>
               </a:rPr>
-              <a:t>test</a:t>
+              <a:t>REC Rick</a:t>
             </a:r>
             <a:endParaRPr b="0" lang="en-AU" sz="3200" spc="-1" strike="noStrike">
               <a:solidFill>
@@ -13570,7 +13570,7 @@
                 <a:latin typeface="Times New Roman"/>
                 <a:ea typeface="Times New Roman"/>
               </a:rPr>
-              <a:t>test.</a:t>
+              <a:t>30th Aug 2023.</a:t>
             </a:r>
             <a:endParaRPr b="0" lang="en-AU" sz="2000" spc="-1" strike="noStrike">
               <a:solidFill>
@@ -13627,7 +13627,7 @@
                 <a:latin typeface="Times New Roman"/>
                 <a:ea typeface="Times New Roman"/>
               </a:rPr>
-              <a:t>test </a:t>
+              <a:t>REC Rick </a:t>
             </a:r>
             <a:r>
               <a:rPr b="0" lang="en-AU" sz="2000" spc="-1" strike="noStrike">
@@ -13910,7 +13910,7 @@
                 <a:latin typeface="Times New Roman"/>
                 <a:ea typeface="Times New Roman"/>
               </a:rPr>
-              <a:t>test</a:t>
+              <a:t>REC Rick</a:t>
             </a:r>
             <a:endParaRPr b="0" lang="en-AU" sz="3600" spc="-1" strike="noStrike">
               <a:solidFill>
@@ -13967,7 +13967,7 @@
                 <a:latin typeface="Times New Roman"/>
                 <a:ea typeface="Times New Roman"/>
               </a:rPr>
-              <a:t>MAJ test</a:t>
+              <a:t>MAJ Jazz</a:t>
             </a:r>
             <a:br>
               <a:rPr sz="1100"/>
@@ -14060,7 +14060,7 @@
                 <a:latin typeface="Courgette"/>
                 <a:ea typeface="Courgette"/>
               </a:rPr>
-              <a:t>MAJ test</a:t>
+              <a:t>MAJ Jazz</a:t>
             </a:r>
             <a:endParaRPr b="0" lang="en-AU" sz="2800" spc="-1" strike="noStrike">
               <a:solidFill>
@@ -14169,7 +14169,7 @@
                 <a:latin typeface="Times New Roman"/>
                 <a:ea typeface="Times New Roman"/>
               </a:rPr>
-              <a:t>test,</a:t>
+              <a:t>Jazz,</a:t>
             </a:r>
             <a:r>
               <a:rPr b="0" lang="en-AU" sz="2000" spc="-1" strike="noStrike">
@@ -14236,7 +14236,7 @@
                 <a:latin typeface="Times New Roman"/>
                 <a:ea typeface="Times New Roman"/>
               </a:rPr>
-              <a:t>test</a:t>
+              <a:t>REC Rick</a:t>
             </a:r>
             <a:endParaRPr b="0" lang="en-AU" sz="3200" spc="-1" strike="noStrike">
               <a:solidFill>
@@ -14339,7 +14339,7 @@
                 <a:latin typeface="Times New Roman"/>
                 <a:ea typeface="Times New Roman"/>
               </a:rPr>
-              <a:t>test.</a:t>
+              <a:t>30th Aug 2023.</a:t>
             </a:r>
             <a:endParaRPr b="0" lang="en-AU" sz="2000" spc="-1" strike="noStrike">
               <a:solidFill>
@@ -14396,7 +14396,7 @@
                 <a:latin typeface="Times New Roman"/>
                 <a:ea typeface="Times New Roman"/>
               </a:rPr>
-              <a:t>test </a:t>
+              <a:t>REC Rick </a:t>
             </a:r>
             <a:r>
               <a:rPr b="0" lang="en-AU" sz="2000" spc="-1" strike="noStrike">
@@ -14679,7 +14679,7 @@
                 <a:latin typeface="Times New Roman"/>
                 <a:ea typeface="Times New Roman"/>
               </a:rPr>
-              <a:t>test</a:t>
+              <a:t>REC Rick</a:t>
             </a:r>
             <a:endParaRPr b="0" lang="en-AU" sz="3600" spc="-1" strike="noStrike">
               <a:solidFill>
@@ -14736,7 +14736,7 @@
                 <a:latin typeface="Times New Roman"/>
                 <a:ea typeface="Times New Roman"/>
               </a:rPr>
-              <a:t>MAJ test</a:t>
+              <a:t>MAJ Jazz</a:t>
             </a:r>
             <a:br>
               <a:rPr sz="1100"/>
@@ -14829,7 +14829,7 @@
                 <a:latin typeface="Courgette"/>
                 <a:ea typeface="Courgette"/>
               </a:rPr>
-              <a:t>MAJ test</a:t>
+              <a:t>MAJ Jazz</a:t>
             </a:r>
             <a:endParaRPr b="0" lang="en-AU" sz="2800" spc="-1" strike="noStrike">
               <a:solidFill>
@@ -14954,7 +14954,7 @@
                 <a:latin typeface="Times New Roman"/>
                 <a:ea typeface="Times New Roman"/>
               </a:rPr>
-              <a:t>test,</a:t>
+              <a:t>Jazz,</a:t>
             </a:r>
             <a:r>
               <a:rPr b="0" lang="en-AU" sz="2000" spc="-1" strike="noStrike">
@@ -15021,7 +15021,7 @@
                 <a:latin typeface="Times New Roman"/>
                 <a:ea typeface="Times New Roman"/>
               </a:rPr>
-              <a:t>test</a:t>
+              <a:t>REC Rick</a:t>
             </a:r>
             <a:endParaRPr b="0" lang="en-AU" sz="3200" spc="-1" strike="noStrike">
               <a:solidFill>
@@ -15124,7 +15124,7 @@
                 <a:latin typeface="Times New Roman"/>
                 <a:ea typeface="Times New Roman"/>
               </a:rPr>
-              <a:t>test.</a:t>
+              <a:t>30th Aug 2023.</a:t>
             </a:r>
             <a:endParaRPr b="0" lang="en-AU" sz="2000" spc="-1" strike="noStrike">
               <a:solidFill>
@@ -15181,7 +15181,7 @@
                 <a:latin typeface="Times New Roman"/>
                 <a:ea typeface="Times New Roman"/>
               </a:rPr>
-              <a:t>test </a:t>
+              <a:t>REC Rick </a:t>
             </a:r>
             <a:r>
               <a:rPr b="0" lang="en-AU" sz="2000" spc="-1" strike="noStrike">

</xml_diff>